<commit_message>
Adding dart raw parser
</commit_message>
<xml_diff>
--- a/luna_authoring_system/samples/Luna_sample_module.pptx
+++ b/luna_authoring_system/samples/Luna_sample_module.pptx
@@ -5,12 +5,13 @@
     <p:sldMasterId id="2147483648" r:id="rId1"/>
   </p:sldMasterIdLst>
   <p:notesMasterIdLst>
-    <p:notesMasterId r:id="rId5"/>
+    <p:notesMasterId r:id="rId6"/>
   </p:notesMasterIdLst>
   <p:sldIdLst>
     <p:sldId id="292" r:id="rId2"/>
     <p:sldId id="291" r:id="rId3"/>
-    <p:sldId id="290" r:id="rId4"/>
+    <p:sldId id="293" r:id="rId4"/>
+    <p:sldId id="290" r:id="rId5"/>
   </p:sldIdLst>
   <p:sldSz cx="4572000" cy="9144000"/>
   <p:notesSz cx="6858000" cy="9144000"/>
@@ -248,7 +249,7 @@
       <p15:sldGuideLst xmlns:p15="http://schemas.microsoft.com/office/powerpoint/2012/main"/>
     </p:ext>
     <p:ext uri="http://customooxmlschemas.google.com/">
-      <go:slidesCustomData xmlns="" xmlns:mc="http://schemas.openxmlformats.org/markup-compatibility/2006" xmlns:mv="urn:schemas-microsoft-com:mac:vml" xmlns:c="http://schemas.openxmlformats.org/drawingml/2006/chart" xmlns:dgm="http://schemas.openxmlformats.org/drawingml/2006/diagram" xmlns:o="urn:schemas-microsoft-com:office:office" xmlns:v="urn:schemas-microsoft-com:vml" xmlns:pvml="urn:schemas-microsoft-com:office:powerpoint" xmlns:com="http://schemas.openxmlformats.org/drawingml/2006/compatibility" xmlns:p14="http://schemas.microsoft.com/office/powerpoint/2010/main" xmlns:p15="http://schemas.microsoft.com/office/powerpoint/2012/main" xmlns:ahyp="http://schemas.microsoft.com/office/drawing/2018/hyperlinkcolor" xmlns:go="http://customooxmlschemas.google.com/" r:id="rId90" roundtripDataSignature="AMtx7mjZqXES8mkqFicRe0dtzk8hyy0PUg=="/>
+      <go:slidesCustomData xmlns:go="http://customooxmlschemas.google.com/" xmlns:ahyp="http://schemas.microsoft.com/office/drawing/2018/hyperlinkcolor" xmlns:p15="http://schemas.microsoft.com/office/powerpoint/2012/main" xmlns:p14="http://schemas.microsoft.com/office/powerpoint/2010/main" xmlns:com="http://schemas.openxmlformats.org/drawingml/2006/compatibility" xmlns:pvml="urn:schemas-microsoft-com:office:powerpoint" xmlns:v="urn:schemas-microsoft-com:vml" xmlns:o="urn:schemas-microsoft-com:office:office" xmlns:dgm="http://schemas.openxmlformats.org/drawingml/2006/diagram" xmlns:c="http://schemas.openxmlformats.org/drawingml/2006/chart" xmlns:mv="urn:schemas-microsoft-com:mac:vml" xmlns:mc="http://schemas.openxmlformats.org/markup-compatibility/2006" xmlns="" r:id="rId90" roundtripDataSignature="AMtx7mjZqXES8mkqFicRe0dtzk8hyy0PUg=="/>
     </p:ext>
   </p:extLst>
 </p:presentation>
@@ -1914,7 +1915,7 @@
                 <a:cs typeface="Calibri"/>
                 <a:sym typeface="Calibri"/>
               </a:rPr>
-              <a:t>3</a:t>
+              <a:t>4</a:t>
             </a:fld>
             <a:endParaRPr lang="en-US" sz="1200" b="0" i="0" u="none" strike="noStrike" cap="none">
               <a:solidFill>
@@ -14740,7 +14741,7 @@
         </p:nvSpPr>
         <p:spPr>
           <a:xfrm>
-            <a:off x="874643" y="2822713"/>
+            <a:off x="1036273" y="2727463"/>
             <a:ext cx="2499454" cy="584775"/>
           </a:xfrm>
           <a:prstGeom prst="rect">
@@ -14780,6 +14781,227 @@
 </file>
 
 <file path=ppt/slides/slide3.xml><?xml version="1.0" encoding="utf-8"?>
+<p:sld xmlns:a="http://schemas.openxmlformats.org/drawingml/2006/main" xmlns:r="http://schemas.openxmlformats.org/officeDocument/2006/relationships" xmlns:p="http://schemas.openxmlformats.org/presentationml/2006/main">
+  <p:cSld>
+    <p:spTree>
+      <p:nvGrpSpPr>
+        <p:cNvPr id="1" name=""/>
+        <p:cNvGrpSpPr/>
+        <p:nvPr/>
+      </p:nvGrpSpPr>
+      <p:grpSpPr>
+        <a:xfrm>
+          <a:off x="0" y="0"/>
+          <a:ext cx="0" cy="0"/>
+          <a:chOff x="0" y="0"/>
+          <a:chExt cx="0" cy="0"/>
+        </a:xfrm>
+      </p:grpSpPr>
+      <p:sp>
+        <p:nvSpPr>
+          <p:cNvPr id="5" name="TextBox 4">
+            <a:extLst>
+              <a:ext uri="{FF2B5EF4-FFF2-40B4-BE49-F238E27FC236}">
+                <a16:creationId xmlns:a16="http://schemas.microsoft.com/office/drawing/2014/main" id="{9CBD4BA2-887F-FA2F-9A65-F51B4CB24EF2}"/>
+              </a:ext>
+            </a:extLst>
+          </p:cNvPr>
+          <p:cNvSpPr txBox="1"/>
+          <p:nvPr/>
+        </p:nvSpPr>
+        <p:spPr>
+          <a:xfrm>
+            <a:off x="1036273" y="2761753"/>
+            <a:ext cx="2499454" cy="1077218"/>
+          </a:xfrm>
+          <a:prstGeom prst="rect">
+            <a:avLst/>
+          </a:prstGeom>
+          <a:noFill/>
+        </p:spPr>
+        <p:txBody>
+          <a:bodyPr wrap="square" rtlCol="0">
+            <a:spAutoFit/>
+          </a:bodyPr>
+          <a:lstStyle/>
+          <a:p>
+            <a:pPr algn="ctr"/>
+            <a:r>
+              <a:rPr lang="en-US" sz="3200" i="1" dirty="0">
+                <a:solidFill>
+                  <a:srgbClr val="00B050"/>
+                </a:solidFill>
+                <a:latin typeface="Abadi MT Condensed Light" panose="020B0306030101010103" pitchFamily="34" charset="77"/>
+              </a:rPr>
+              <a:t>This</a:t>
+            </a:r>
+            <a:r>
+              <a:rPr lang="en-US" sz="3200" i="1" dirty="0">
+                <a:solidFill>
+                  <a:srgbClr val="00B050"/>
+                </a:solidFill>
+              </a:rPr>
+              <a:t> </a:t>
+            </a:r>
+            <a:r>
+              <a:rPr lang="en-US" b="1" i="1" dirty="0">
+                <a:solidFill>
+                  <a:srgbClr val="00B050"/>
+                </a:solidFill>
+              </a:rPr>
+              <a:t>is</a:t>
+            </a:r>
+            <a:r>
+              <a:rPr lang="en-US" sz="3200" i="1" dirty="0">
+                <a:solidFill>
+                  <a:srgbClr val="00B050"/>
+                </a:solidFill>
+              </a:rPr>
+              <a:t> </a:t>
+            </a:r>
+            <a:r>
+              <a:rPr lang="en-US" sz="1600" i="1" dirty="0">
+                <a:solidFill>
+                  <a:schemeClr val="tx1"/>
+                </a:solidFill>
+              </a:rPr>
+              <a:t>my</a:t>
+            </a:r>
+            <a:r>
+              <a:rPr lang="en-US" sz="3200" i="1" dirty="0">
+                <a:solidFill>
+                  <a:srgbClr val="00B050"/>
+                </a:solidFill>
+              </a:rPr>
+              <a:t> </a:t>
+            </a:r>
+            <a:r>
+              <a:rPr lang="en-US" sz="3200" i="1" dirty="0">
+                <a:solidFill>
+                  <a:srgbClr val="00B050"/>
+                </a:solidFill>
+                <a:highlight>
+                  <a:srgbClr val="FFFF00"/>
+                </a:highlight>
+              </a:rPr>
+              <a:t>Textbox</a:t>
+            </a:r>
+          </a:p>
+        </p:txBody>
+      </p:sp>
+      <p:sp>
+        <p:nvSpPr>
+          <p:cNvPr id="2" name="TextBox 1">
+            <a:extLst>
+              <a:ext uri="{FF2B5EF4-FFF2-40B4-BE49-F238E27FC236}">
+                <a16:creationId xmlns:a16="http://schemas.microsoft.com/office/drawing/2014/main" id="{4C9C29EE-C5FF-635D-8237-0970AD71424F}"/>
+              </a:ext>
+            </a:extLst>
+          </p:cNvPr>
+          <p:cNvSpPr txBox="1"/>
+          <p:nvPr/>
+        </p:nvSpPr>
+        <p:spPr>
+          <a:xfrm>
+            <a:off x="1036273" y="4572000"/>
+            <a:ext cx="2499454" cy="1077218"/>
+          </a:xfrm>
+          <a:prstGeom prst="rect">
+            <a:avLst/>
+          </a:prstGeom>
+          <a:noFill/>
+        </p:spPr>
+        <p:txBody>
+          <a:bodyPr wrap="square" rtlCol="0">
+            <a:spAutoFit/>
+          </a:bodyPr>
+          <a:lstStyle/>
+          <a:p>
+            <a:pPr algn="r"/>
+            <a:r>
+              <a:rPr lang="en-US" sz="3200" i="1" dirty="0">
+                <a:solidFill>
+                  <a:srgbClr val="00B050"/>
+                </a:solidFill>
+                <a:latin typeface="+mn-lt"/>
+              </a:rPr>
+              <a:t>Right Aligned Text</a:t>
+            </a:r>
+            <a:endParaRPr lang="en-US" sz="3200" i="1" dirty="0">
+              <a:solidFill>
+                <a:srgbClr val="00B050"/>
+              </a:solidFill>
+              <a:highlight>
+                <a:srgbClr val="FFFF00"/>
+              </a:highlight>
+              <a:latin typeface="+mn-lt"/>
+            </a:endParaRPr>
+          </a:p>
+        </p:txBody>
+      </p:sp>
+      <p:sp>
+        <p:nvSpPr>
+          <p:cNvPr id="3" name="TextBox 2">
+            <a:extLst>
+              <a:ext uri="{FF2B5EF4-FFF2-40B4-BE49-F238E27FC236}">
+                <a16:creationId xmlns:a16="http://schemas.microsoft.com/office/drawing/2014/main" id="{484F3D99-C430-F24E-A196-36CE313C5923}"/>
+              </a:ext>
+            </a:extLst>
+          </p:cNvPr>
+          <p:cNvSpPr txBox="1"/>
+          <p:nvPr/>
+        </p:nvSpPr>
+        <p:spPr>
+          <a:xfrm>
+            <a:off x="1036273" y="6038850"/>
+            <a:ext cx="2499454" cy="1077218"/>
+          </a:xfrm>
+          <a:prstGeom prst="rect">
+            <a:avLst/>
+          </a:prstGeom>
+          <a:noFill/>
+        </p:spPr>
+        <p:txBody>
+          <a:bodyPr wrap="square" rtlCol="0">
+            <a:spAutoFit/>
+          </a:bodyPr>
+          <a:lstStyle/>
+          <a:p>
+            <a:r>
+              <a:rPr lang="en-US" sz="3200" i="1" dirty="0">
+                <a:solidFill>
+                  <a:srgbClr val="00B050"/>
+                </a:solidFill>
+                <a:latin typeface="+mn-lt"/>
+              </a:rPr>
+              <a:t>Right Aligned Text</a:t>
+            </a:r>
+            <a:endParaRPr lang="en-US" sz="3200" i="1" dirty="0">
+              <a:solidFill>
+                <a:srgbClr val="00B050"/>
+              </a:solidFill>
+              <a:highlight>
+                <a:srgbClr val="FFFF00"/>
+              </a:highlight>
+              <a:latin typeface="+mn-lt"/>
+            </a:endParaRPr>
+          </a:p>
+        </p:txBody>
+      </p:sp>
+    </p:spTree>
+    <p:extLst>
+      <p:ext uri="{BB962C8B-B14F-4D97-AF65-F5344CB8AC3E}">
+        <p14:creationId xmlns:p14="http://schemas.microsoft.com/office/powerpoint/2010/main" val="113143355"/>
+      </p:ext>
+    </p:extLst>
+  </p:cSld>
+  <p:clrMapOvr>
+    <a:masterClrMapping/>
+  </p:clrMapOvr>
+</p:sld>
+</file>
+
+<file path=ppt/slides/slide4.xml><?xml version="1.0" encoding="utf-8"?>
 <p:sld xmlns:a="http://schemas.openxmlformats.org/drawingml/2006/main" xmlns:r="http://schemas.openxmlformats.org/officeDocument/2006/relationships" xmlns:p="http://schemas.openxmlformats.org/presentationml/2006/main">
   <p:cSld>
     <p:spTree>

</xml_diff>